<commit_message>
Update Kitchen Slide App Dev.pptx
</commit_message>
<xml_diff>
--- a/Kitchen Slide App Dev.pptx
+++ b/Kitchen Slide App Dev.pptx
@@ -2,7 +2,7 @@
 <file path=ppt/presentation.xml><?xml version="1.0" encoding="utf-8"?>
 <p:presentation xmlns:a="http://schemas.openxmlformats.org/drawingml/2006/main" xmlns:r="http://schemas.openxmlformats.org/officeDocument/2006/relationships" xmlns:p="http://schemas.openxmlformats.org/presentationml/2006/main" saveSubsetFonts="1">
   <p:sldMasterIdLst>
-    <p:sldMasterId id="2147483696" r:id="rId1"/>
+    <p:sldMasterId id="2147483714" r:id="rId1"/>
   </p:sldMasterIdLst>
   <p:sldIdLst>
     <p:sldId id="257" r:id="rId2"/>
@@ -104,6 +104,11 @@
       </a:defRPr>
     </a:lvl9pPr>
   </p:defaultTextStyle>
+  <p:extLst>
+    <p:ext uri="{EFAFB233-063F-42B5-8137-9DF3F51BA10A}">
+      <p15:sldGuideLst xmlns:p15="http://schemas.microsoft.com/office/powerpoint/2012/main"/>
+    </p:ext>
+  </p:extLst>
 </p:presentation>
 </file>
 
@@ -344,7 +349,7 @@
           <a:p>
             <a:fld id="{99335B4E-05B3-4C44-9D41-E6E9066C73C4}" type="datetimeFigureOut">
               <a:rPr lang="en-US" smtClean="0"/>
-              <a:t>11/30/2020</a:t>
+              <a:t>12/3/2020</a:t>
             </a:fld>
             <a:endParaRPr lang="en-US"/>
           </a:p>
@@ -405,7 +410,7 @@
     </p:spTree>
     <p:extLst>
       <p:ext uri="{BB962C8B-B14F-4D97-AF65-F5344CB8AC3E}">
-        <p14:creationId xmlns:p14="http://schemas.microsoft.com/office/powerpoint/2010/main" val="1822986995"/>
+        <p14:creationId xmlns:p14="http://schemas.microsoft.com/office/powerpoint/2010/main" val="223573027"/>
       </p:ext>
     </p:extLst>
   </p:cSld>
@@ -678,7 +683,7 @@
           <a:p>
             <a:fld id="{99335B4E-05B3-4C44-9D41-E6E9066C73C4}" type="datetimeFigureOut">
               <a:rPr lang="en-US" smtClean="0"/>
-              <a:t>11/30/2020</a:t>
+              <a:t>12/3/2020</a:t>
             </a:fld>
             <a:endParaRPr lang="en-US"/>
           </a:p>
@@ -729,7 +734,7 @@
     </p:spTree>
     <p:extLst>
       <p:ext uri="{BB962C8B-B14F-4D97-AF65-F5344CB8AC3E}">
-        <p14:creationId xmlns:p14="http://schemas.microsoft.com/office/powerpoint/2010/main" val="1800831024"/>
+        <p14:creationId xmlns:p14="http://schemas.microsoft.com/office/powerpoint/2010/main" val="3747168611"/>
       </p:ext>
     </p:extLst>
   </p:cSld>
@@ -956,7 +961,7 @@
           <a:p>
             <a:fld id="{99335B4E-05B3-4C44-9D41-E6E9066C73C4}" type="datetimeFigureOut">
               <a:rPr lang="en-US" smtClean="0"/>
-              <a:t>11/30/2020</a:t>
+              <a:t>12/3/2020</a:t>
             </a:fld>
             <a:endParaRPr lang="en-US"/>
           </a:p>
@@ -1007,7 +1012,7 @@
     </p:spTree>
     <p:extLst>
       <p:ext uri="{BB962C8B-B14F-4D97-AF65-F5344CB8AC3E}">
-        <p14:creationId xmlns:p14="http://schemas.microsoft.com/office/powerpoint/2010/main" val="3574503475"/>
+        <p14:creationId xmlns:p14="http://schemas.microsoft.com/office/powerpoint/2010/main" val="2415700512"/>
       </p:ext>
     </p:extLst>
   </p:cSld>
@@ -1524,7 +1529,7 @@
           <a:p>
             <a:fld id="{99335B4E-05B3-4C44-9D41-E6E9066C73C4}" type="datetimeFigureOut">
               <a:rPr lang="en-US" smtClean="0"/>
-              <a:t>11/30/2020</a:t>
+              <a:t>12/3/2020</a:t>
             </a:fld>
             <a:endParaRPr lang="en-US"/>
           </a:p>
@@ -1575,7 +1580,7 @@
     </p:spTree>
     <p:extLst>
       <p:ext uri="{BB962C8B-B14F-4D97-AF65-F5344CB8AC3E}">
-        <p14:creationId xmlns:p14="http://schemas.microsoft.com/office/powerpoint/2010/main" val="1032820083"/>
+        <p14:creationId xmlns:p14="http://schemas.microsoft.com/office/powerpoint/2010/main" val="4274176034"/>
       </p:ext>
     </p:extLst>
   </p:cSld>
@@ -1802,7 +1807,7 @@
           <a:p>
             <a:fld id="{99335B4E-05B3-4C44-9D41-E6E9066C73C4}" type="datetimeFigureOut">
               <a:rPr lang="en-US" smtClean="0"/>
-              <a:t>11/30/2020</a:t>
+              <a:t>12/3/2020</a:t>
             </a:fld>
             <a:endParaRPr lang="en-US"/>
           </a:p>
@@ -1853,7 +1858,7 @@
     </p:spTree>
     <p:extLst>
       <p:ext uri="{BB962C8B-B14F-4D97-AF65-F5344CB8AC3E}">
-        <p14:creationId xmlns:p14="http://schemas.microsoft.com/office/powerpoint/2010/main" val="2885468732"/>
+        <p14:creationId xmlns:p14="http://schemas.microsoft.com/office/powerpoint/2010/main" val="1958400283"/>
       </p:ext>
     </p:extLst>
   </p:cSld>
@@ -2364,7 +2369,7 @@
           <a:p>
             <a:fld id="{99335B4E-05B3-4C44-9D41-E6E9066C73C4}" type="datetimeFigureOut">
               <a:rPr lang="en-US" smtClean="0"/>
-              <a:t>11/30/2020</a:t>
+              <a:t>12/3/2020</a:t>
             </a:fld>
             <a:endParaRPr lang="en-US"/>
           </a:p>
@@ -2415,7 +2420,7 @@
     </p:spTree>
     <p:extLst>
       <p:ext uri="{BB962C8B-B14F-4D97-AF65-F5344CB8AC3E}">
-        <p14:creationId xmlns:p14="http://schemas.microsoft.com/office/powerpoint/2010/main" val="2183040867"/>
+        <p14:creationId xmlns:p14="http://schemas.microsoft.com/office/powerpoint/2010/main" val="2378581049"/>
       </p:ext>
     </p:extLst>
   </p:cSld>
@@ -2691,7 +2696,7 @@
           <a:p>
             <a:fld id="{99335B4E-05B3-4C44-9D41-E6E9066C73C4}" type="datetimeFigureOut">
               <a:rPr lang="en-US" smtClean="0"/>
-              <a:t>11/30/2020</a:t>
+              <a:t>12/3/2020</a:t>
             </a:fld>
             <a:endParaRPr lang="en-US"/>
           </a:p>
@@ -2742,7 +2747,7 @@
     </p:spTree>
     <p:extLst>
       <p:ext uri="{BB962C8B-B14F-4D97-AF65-F5344CB8AC3E}">
-        <p14:creationId xmlns:p14="http://schemas.microsoft.com/office/powerpoint/2010/main" val="3391669184"/>
+        <p14:creationId xmlns:p14="http://schemas.microsoft.com/office/powerpoint/2010/main" val="2790668249"/>
       </p:ext>
     </p:extLst>
   </p:cSld>
@@ -2868,7 +2873,7 @@
           <a:p>
             <a:fld id="{99335B4E-05B3-4C44-9D41-E6E9066C73C4}" type="datetimeFigureOut">
               <a:rPr lang="en-US" smtClean="0"/>
-              <a:t>11/30/2020</a:t>
+              <a:t>12/3/2020</a:t>
             </a:fld>
             <a:endParaRPr lang="en-US"/>
           </a:p>
@@ -2947,7 +2952,7 @@
     </p:spTree>
     <p:extLst>
       <p:ext uri="{BB962C8B-B14F-4D97-AF65-F5344CB8AC3E}">
-        <p14:creationId xmlns:p14="http://schemas.microsoft.com/office/powerpoint/2010/main" val="1405075698"/>
+        <p14:creationId xmlns:p14="http://schemas.microsoft.com/office/powerpoint/2010/main" val="1876304869"/>
       </p:ext>
     </p:extLst>
   </p:cSld>
@@ -3106,7 +3111,7 @@
           <a:p>
             <a:fld id="{99335B4E-05B3-4C44-9D41-E6E9066C73C4}" type="datetimeFigureOut">
               <a:rPr lang="en-US" smtClean="0"/>
-              <a:t>11/30/2020</a:t>
+              <a:t>12/3/2020</a:t>
             </a:fld>
             <a:endParaRPr lang="en-US"/>
           </a:p>
@@ -3157,7 +3162,7 @@
     </p:spTree>
     <p:extLst>
       <p:ext uri="{BB962C8B-B14F-4D97-AF65-F5344CB8AC3E}">
-        <p14:creationId xmlns:p14="http://schemas.microsoft.com/office/powerpoint/2010/main" val="226625064"/>
+        <p14:creationId xmlns:p14="http://schemas.microsoft.com/office/powerpoint/2010/main" val="996489297"/>
       </p:ext>
     </p:extLst>
   </p:cSld>
@@ -3306,7 +3311,7 @@
           <a:p>
             <a:fld id="{99335B4E-05B3-4C44-9D41-E6E9066C73C4}" type="datetimeFigureOut">
               <a:rPr lang="en-US" smtClean="0"/>
-              <a:t>11/30/2020</a:t>
+              <a:t>12/3/2020</a:t>
             </a:fld>
             <a:endParaRPr lang="en-US"/>
           </a:p>
@@ -3357,7 +3362,7 @@
     </p:spTree>
     <p:extLst>
       <p:ext uri="{BB962C8B-B14F-4D97-AF65-F5344CB8AC3E}">
-        <p14:creationId xmlns:p14="http://schemas.microsoft.com/office/powerpoint/2010/main" val="935878417"/>
+        <p14:creationId xmlns:p14="http://schemas.microsoft.com/office/powerpoint/2010/main" val="1222485075"/>
       </p:ext>
     </p:extLst>
   </p:cSld>
@@ -3582,7 +3587,7 @@
           <a:p>
             <a:fld id="{99335B4E-05B3-4C44-9D41-E6E9066C73C4}" type="datetimeFigureOut">
               <a:rPr lang="en-US" smtClean="0"/>
-              <a:t>11/30/2020</a:t>
+              <a:t>12/3/2020</a:t>
             </a:fld>
             <a:endParaRPr lang="en-US"/>
           </a:p>
@@ -3633,7 +3638,7 @@
     </p:spTree>
     <p:extLst>
       <p:ext uri="{BB962C8B-B14F-4D97-AF65-F5344CB8AC3E}">
-        <p14:creationId xmlns:p14="http://schemas.microsoft.com/office/powerpoint/2010/main" val="1221638856"/>
+        <p14:creationId xmlns:p14="http://schemas.microsoft.com/office/powerpoint/2010/main" val="1403607854"/>
       </p:ext>
     </p:extLst>
   </p:cSld>
@@ -3848,7 +3853,7 @@
           <a:p>
             <a:fld id="{99335B4E-05B3-4C44-9D41-E6E9066C73C4}" type="datetimeFigureOut">
               <a:rPr lang="en-US" smtClean="0"/>
-              <a:t>11/30/2020</a:t>
+              <a:t>12/3/2020</a:t>
             </a:fld>
             <a:endParaRPr lang="en-US"/>
           </a:p>
@@ -3899,7 +3904,7 @@
     </p:spTree>
     <p:extLst>
       <p:ext uri="{BB962C8B-B14F-4D97-AF65-F5344CB8AC3E}">
-        <p14:creationId xmlns:p14="http://schemas.microsoft.com/office/powerpoint/2010/main" val="1702086696"/>
+        <p14:creationId xmlns:p14="http://schemas.microsoft.com/office/powerpoint/2010/main" val="1949881563"/>
       </p:ext>
     </p:extLst>
   </p:cSld>
@@ -4222,7 +4227,7 @@
           <a:p>
             <a:fld id="{99335B4E-05B3-4C44-9D41-E6E9066C73C4}" type="datetimeFigureOut">
               <a:rPr lang="en-US" smtClean="0"/>
-              <a:t>11/30/2020</a:t>
+              <a:t>12/3/2020</a:t>
             </a:fld>
             <a:endParaRPr lang="en-US"/>
           </a:p>
@@ -4273,7 +4278,7 @@
     </p:spTree>
     <p:extLst>
       <p:ext uri="{BB962C8B-B14F-4D97-AF65-F5344CB8AC3E}">
-        <p14:creationId xmlns:p14="http://schemas.microsoft.com/office/powerpoint/2010/main" val="1755992580"/>
+        <p14:creationId xmlns:p14="http://schemas.microsoft.com/office/powerpoint/2010/main" val="1886940195"/>
       </p:ext>
     </p:extLst>
   </p:cSld>
@@ -4370,7 +4375,7 @@
           <a:p>
             <a:fld id="{99335B4E-05B3-4C44-9D41-E6E9066C73C4}" type="datetimeFigureOut">
               <a:rPr lang="en-US" smtClean="0"/>
-              <a:t>11/30/2020</a:t>
+              <a:t>12/3/2020</a:t>
             </a:fld>
             <a:endParaRPr lang="en-US"/>
           </a:p>
@@ -4421,7 +4426,7 @@
     </p:spTree>
     <p:extLst>
       <p:ext uri="{BB962C8B-B14F-4D97-AF65-F5344CB8AC3E}">
-        <p14:creationId xmlns:p14="http://schemas.microsoft.com/office/powerpoint/2010/main" val="3957451806"/>
+        <p14:creationId xmlns:p14="http://schemas.microsoft.com/office/powerpoint/2010/main" val="2910323552"/>
       </p:ext>
     </p:extLst>
   </p:cSld>
@@ -4495,7 +4500,7 @@
           <a:p>
             <a:fld id="{99335B4E-05B3-4C44-9D41-E6E9066C73C4}" type="datetimeFigureOut">
               <a:rPr lang="en-US" smtClean="0"/>
-              <a:t>11/30/2020</a:t>
+              <a:t>12/3/2020</a:t>
             </a:fld>
             <a:endParaRPr lang="en-US"/>
           </a:p>
@@ -4546,7 +4551,7 @@
     </p:spTree>
     <p:extLst>
       <p:ext uri="{BB962C8B-B14F-4D97-AF65-F5344CB8AC3E}">
-        <p14:creationId xmlns:p14="http://schemas.microsoft.com/office/powerpoint/2010/main" val="4234072170"/>
+        <p14:creationId xmlns:p14="http://schemas.microsoft.com/office/powerpoint/2010/main" val="255218690"/>
       </p:ext>
     </p:extLst>
   </p:cSld>
@@ -4780,7 +4785,7 @@
           <a:p>
             <a:fld id="{99335B4E-05B3-4C44-9D41-E6E9066C73C4}" type="datetimeFigureOut">
               <a:rPr lang="en-US" smtClean="0"/>
-              <a:t>11/30/2020</a:t>
+              <a:t>12/3/2020</a:t>
             </a:fld>
             <a:endParaRPr lang="en-US"/>
           </a:p>
@@ -4831,7 +4836,7 @@
     </p:spTree>
     <p:extLst>
       <p:ext uri="{BB962C8B-B14F-4D97-AF65-F5344CB8AC3E}">
-        <p14:creationId xmlns:p14="http://schemas.microsoft.com/office/powerpoint/2010/main" val="2427860380"/>
+        <p14:creationId xmlns:p14="http://schemas.microsoft.com/office/powerpoint/2010/main" val="1587078088"/>
       </p:ext>
     </p:extLst>
   </p:cSld>
@@ -5104,7 +5109,7 @@
           <a:p>
             <a:fld id="{99335B4E-05B3-4C44-9D41-E6E9066C73C4}" type="datetimeFigureOut">
               <a:rPr lang="en-US" smtClean="0"/>
-              <a:t>11/30/2020</a:t>
+              <a:t>12/3/2020</a:t>
             </a:fld>
             <a:endParaRPr lang="en-US"/>
           </a:p>
@@ -5155,7 +5160,7 @@
     </p:spTree>
     <p:extLst>
       <p:ext uri="{BB962C8B-B14F-4D97-AF65-F5344CB8AC3E}">
-        <p14:creationId xmlns:p14="http://schemas.microsoft.com/office/powerpoint/2010/main" val="3902519144"/>
+        <p14:creationId xmlns:p14="http://schemas.microsoft.com/office/powerpoint/2010/main" val="2990164710"/>
       </p:ext>
     </p:extLst>
   </p:cSld>
@@ -5318,7 +5323,7 @@
           <a:p>
             <a:fld id="{99335B4E-05B3-4C44-9D41-E6E9066C73C4}" type="datetimeFigureOut">
               <a:rPr lang="en-US" smtClean="0"/>
-              <a:t>11/30/2020</a:t>
+              <a:t>12/3/2020</a:t>
             </a:fld>
             <a:endParaRPr lang="en-US"/>
           </a:p>
@@ -5405,29 +5410,29 @@
     </p:spTree>
     <p:extLst>
       <p:ext uri="{BB962C8B-B14F-4D97-AF65-F5344CB8AC3E}">
-        <p14:creationId xmlns:p14="http://schemas.microsoft.com/office/powerpoint/2010/main" val="2374941400"/>
+        <p14:creationId xmlns:p14="http://schemas.microsoft.com/office/powerpoint/2010/main" val="3496983773"/>
       </p:ext>
     </p:extLst>
   </p:cSld>
   <p:clrMap bg1="dk1" tx1="lt1" bg2="dk2" tx2="lt2" accent1="accent1" accent2="accent2" accent3="accent3" accent4="accent4" accent5="accent5" accent6="accent6" hlink="hlink" folHlink="folHlink"/>
   <p:sldLayoutIdLst>
-    <p:sldLayoutId id="2147483697" r:id="rId1"/>
-    <p:sldLayoutId id="2147483698" r:id="rId2"/>
-    <p:sldLayoutId id="2147483699" r:id="rId3"/>
-    <p:sldLayoutId id="2147483700" r:id="rId4"/>
-    <p:sldLayoutId id="2147483701" r:id="rId5"/>
-    <p:sldLayoutId id="2147483702" r:id="rId6"/>
-    <p:sldLayoutId id="2147483703" r:id="rId7"/>
-    <p:sldLayoutId id="2147483704" r:id="rId8"/>
-    <p:sldLayoutId id="2147483705" r:id="rId9"/>
-    <p:sldLayoutId id="2147483706" r:id="rId10"/>
-    <p:sldLayoutId id="2147483707" r:id="rId11"/>
-    <p:sldLayoutId id="2147483708" r:id="rId12"/>
-    <p:sldLayoutId id="2147483709" r:id="rId13"/>
-    <p:sldLayoutId id="2147483710" r:id="rId14"/>
-    <p:sldLayoutId id="2147483711" r:id="rId15"/>
-    <p:sldLayoutId id="2147483712" r:id="rId16"/>
-    <p:sldLayoutId id="2147483713" r:id="rId17"/>
+    <p:sldLayoutId id="2147483715" r:id="rId1"/>
+    <p:sldLayoutId id="2147483716" r:id="rId2"/>
+    <p:sldLayoutId id="2147483717" r:id="rId3"/>
+    <p:sldLayoutId id="2147483718" r:id="rId4"/>
+    <p:sldLayoutId id="2147483719" r:id="rId5"/>
+    <p:sldLayoutId id="2147483720" r:id="rId6"/>
+    <p:sldLayoutId id="2147483721" r:id="rId7"/>
+    <p:sldLayoutId id="2147483722" r:id="rId8"/>
+    <p:sldLayoutId id="2147483723" r:id="rId9"/>
+    <p:sldLayoutId id="2147483724" r:id="rId10"/>
+    <p:sldLayoutId id="2147483725" r:id="rId11"/>
+    <p:sldLayoutId id="2147483726" r:id="rId12"/>
+    <p:sldLayoutId id="2147483727" r:id="rId13"/>
+    <p:sldLayoutId id="2147483728" r:id="rId14"/>
+    <p:sldLayoutId id="2147483729" r:id="rId15"/>
+    <p:sldLayoutId id="2147483730" r:id="rId16"/>
+    <p:sldLayoutId id="2147483731" r:id="rId17"/>
   </p:sldLayoutIdLst>
   <p:txStyles>
     <p:titleStyle>
@@ -5860,25 +5865,29 @@
           <a:lstStyle/>
           <a:p>
             <a:r>
-              <a:rPr lang="en-US" sz="4400" dirty="0">
+              <a:rPr lang="en-US" sz="4400">
                 <a:latin typeface="Aldhabi" panose="01000000000000000000" pitchFamily="2" charset="-78"/>
                 <a:cs typeface="Aldhabi" panose="01000000000000000000" pitchFamily="2" charset="-78"/>
               </a:rPr>
               <a:t>Voice-Activated Kitchen Assistant</a:t>
             </a:r>
             <a:br>
-              <a:rPr lang="en-US" sz="4400" dirty="0">
+              <a:rPr lang="en-US" sz="4400">
                 <a:latin typeface="Aldhabi" panose="01000000000000000000" pitchFamily="2" charset="-78"/>
                 <a:cs typeface="Aldhabi" panose="01000000000000000000" pitchFamily="2" charset="-78"/>
               </a:rPr>
             </a:br>
             <a:r>
-              <a:rPr lang="en-US" sz="4400" dirty="0">
+              <a:rPr lang="en-US" sz="4400">
                 <a:latin typeface="Aldhabi" panose="01000000000000000000" pitchFamily="2" charset="-78"/>
                 <a:cs typeface="Aldhabi" panose="01000000000000000000" pitchFamily="2" charset="-78"/>
               </a:rPr>
               <a:t>	talk to your “kitchen”</a:t>
             </a:r>
+            <a:endParaRPr lang="en-US" sz="4400" dirty="0">
+              <a:latin typeface="Aldhabi" panose="01000000000000000000" pitchFamily="2" charset="-78"/>
+              <a:cs typeface="Aldhabi" panose="01000000000000000000" pitchFamily="2" charset="-78"/>
+            </a:endParaRPr>
           </a:p>
         </p:txBody>
       </p:sp>
@@ -5973,26 +5982,26 @@
         </p:nvSpPr>
         <p:spPr>
           <a:xfrm>
-            <a:off x="5184916" y="5709818"/>
-            <a:ext cx="2001947" cy="778507"/>
+            <a:off x="5315463" y="5654938"/>
+            <a:ext cx="1800355" cy="712841"/>
           </a:xfrm>
         </p:spPr>
         <p:txBody>
           <a:bodyPr vert="horz" lIns="91440" tIns="45720" rIns="91440" bIns="45720" rtlCol="0" anchor="t">
-            <a:normAutofit fontScale="92500" lnSpcReduction="20000"/>
+            <a:normAutofit fontScale="85000" lnSpcReduction="20000"/>
           </a:bodyPr>
           <a:lstStyle/>
           <a:p>
-            <a:pPr marL="57150"/>
-            <a:r>
-              <a:rPr lang="en-US" sz="1800" dirty="0"/>
+            <a:pPr marL="57150" algn="ctr"/>
+            <a:r>
+              <a:rPr lang="en-US" sz="1800"/>
               <a:t>Michael Friedel</a:t>
             </a:r>
           </a:p>
           <a:p>
-            <a:pPr marL="57150"/>
-            <a:r>
-              <a:rPr lang="en-US" sz="1800" dirty="0"/>
+            <a:pPr marL="57150" algn="ctr"/>
+            <a:r>
+              <a:rPr lang="en-US" sz="1800"/>
               <a:t>Baron Wasden</a:t>
             </a:r>
           </a:p>
@@ -6090,8 +6099,8 @@
         </p:blipFill>
         <p:spPr>
           <a:xfrm>
-            <a:off x="4717900" y="5227688"/>
-            <a:ext cx="2601967" cy="1742766"/>
+            <a:off x="4951468" y="5183831"/>
+            <a:ext cx="2601967" cy="1674169"/>
           </a:xfrm>
           <a:prstGeom prst="rect">
             <a:avLst/>
@@ -6183,9 +6192,46 @@
           <a:p>
             <a:pPr algn="ctr"/>
             <a:r>
-              <a:rPr lang="en-US" dirty="0"/>
+              <a:rPr lang="en-US"/>
               <a:t>“Hey, Kitchen.”</a:t>
             </a:r>
+            <a:endParaRPr lang="en-US" dirty="0"/>
+          </a:p>
+        </p:txBody>
+      </p:sp>
+      <p:sp>
+        <p:nvSpPr>
+          <p:cNvPr id="3" name="TextBox 2">
+            <a:extLst>
+              <a:ext uri="{FF2B5EF4-FFF2-40B4-BE49-F238E27FC236}">
+                <a16:creationId xmlns:a16="http://schemas.microsoft.com/office/drawing/2014/main" id="{A9A9828D-B88D-4E78-A277-F75D1179C40E}"/>
+              </a:ext>
+            </a:extLst>
+          </p:cNvPr>
+          <p:cNvSpPr txBox="1"/>
+          <p:nvPr/>
+        </p:nvSpPr>
+        <p:spPr>
+          <a:xfrm>
+            <a:off x="304312" y="6106169"/>
+            <a:ext cx="4102356" cy="523220"/>
+          </a:xfrm>
+          <a:prstGeom prst="rect">
+            <a:avLst/>
+          </a:prstGeom>
+          <a:noFill/>
+        </p:spPr>
+        <p:txBody>
+          <a:bodyPr wrap="square" rtlCol="0">
+            <a:spAutoFit/>
+          </a:bodyPr>
+          <a:lstStyle/>
+          <a:p>
+            <a:r>
+              <a:rPr lang="en-US" sz="1400"/>
+              <a:t>Github.com/ksu-is/Voice-Activated-Home-Food-Tracking-System</a:t>
+            </a:r>
+            <a:endParaRPr lang="en-US" sz="1400" dirty="0"/>
           </a:p>
         </p:txBody>
       </p:sp>

</xml_diff>